<commit_message>
effected changes on stats module and added SQL notes
</commit_message>
<xml_diff>
--- a/Module 2 - Statistics for Data Science/Basic statistics for Data Professionals.pptx
+++ b/Module 2 - Statistics for Data Science/Basic statistics for Data Professionals.pptx
@@ -7239,7 +7239,7 @@
           <a:p>
             <a:fld id="{3540748E-A5A9-4F34-B25A-B9BF70013652}" type="datetimeFigureOut">
               <a:rPr lang="en-US" smtClean="0"/>
-              <a:t>6/21/2024</a:t>
+              <a:t>2/19/2025</a:t>
             </a:fld>
             <a:endParaRPr lang="en-US"/>
           </a:p>
@@ -7437,7 +7437,7 @@
           <a:p>
             <a:fld id="{3540748E-A5A9-4F34-B25A-B9BF70013652}" type="datetimeFigureOut">
               <a:rPr lang="en-US" smtClean="0"/>
-              <a:t>6/21/2024</a:t>
+              <a:t>2/19/2025</a:t>
             </a:fld>
             <a:endParaRPr lang="en-US"/>
           </a:p>
@@ -7645,7 +7645,7 @@
           <a:p>
             <a:fld id="{3540748E-A5A9-4F34-B25A-B9BF70013652}" type="datetimeFigureOut">
               <a:rPr lang="en-US" smtClean="0"/>
-              <a:t>6/21/2024</a:t>
+              <a:t>2/19/2025</a:t>
             </a:fld>
             <a:endParaRPr lang="en-US"/>
           </a:p>
@@ -7843,7 +7843,7 @@
           <a:p>
             <a:fld id="{3540748E-A5A9-4F34-B25A-B9BF70013652}" type="datetimeFigureOut">
               <a:rPr lang="en-US" smtClean="0"/>
-              <a:t>6/21/2024</a:t>
+              <a:t>2/19/2025</a:t>
             </a:fld>
             <a:endParaRPr lang="en-US"/>
           </a:p>
@@ -8118,7 +8118,7 @@
           <a:p>
             <a:fld id="{3540748E-A5A9-4F34-B25A-B9BF70013652}" type="datetimeFigureOut">
               <a:rPr lang="en-US" smtClean="0"/>
-              <a:t>6/21/2024</a:t>
+              <a:t>2/19/2025</a:t>
             </a:fld>
             <a:endParaRPr lang="en-US"/>
           </a:p>
@@ -8383,7 +8383,7 @@
           <a:p>
             <a:fld id="{3540748E-A5A9-4F34-B25A-B9BF70013652}" type="datetimeFigureOut">
               <a:rPr lang="en-US" smtClean="0"/>
-              <a:t>6/21/2024</a:t>
+              <a:t>2/19/2025</a:t>
             </a:fld>
             <a:endParaRPr lang="en-US"/>
           </a:p>
@@ -8795,7 +8795,7 @@
           <a:p>
             <a:fld id="{3540748E-A5A9-4F34-B25A-B9BF70013652}" type="datetimeFigureOut">
               <a:rPr lang="en-US" smtClean="0"/>
-              <a:t>6/21/2024</a:t>
+              <a:t>2/19/2025</a:t>
             </a:fld>
             <a:endParaRPr lang="en-US"/>
           </a:p>
@@ -8936,7 +8936,7 @@
           <a:p>
             <a:fld id="{3540748E-A5A9-4F34-B25A-B9BF70013652}" type="datetimeFigureOut">
               <a:rPr lang="en-US" smtClean="0"/>
-              <a:t>6/21/2024</a:t>
+              <a:t>2/19/2025</a:t>
             </a:fld>
             <a:endParaRPr lang="en-US"/>
           </a:p>
@@ -9049,7 +9049,7 @@
           <a:p>
             <a:fld id="{3540748E-A5A9-4F34-B25A-B9BF70013652}" type="datetimeFigureOut">
               <a:rPr lang="en-US" smtClean="0"/>
-              <a:t>6/21/2024</a:t>
+              <a:t>2/19/2025</a:t>
             </a:fld>
             <a:endParaRPr lang="en-US"/>
           </a:p>
@@ -9360,7 +9360,7 @@
           <a:p>
             <a:fld id="{3540748E-A5A9-4F34-B25A-B9BF70013652}" type="datetimeFigureOut">
               <a:rPr lang="en-US" smtClean="0"/>
-              <a:t>6/21/2024</a:t>
+              <a:t>2/19/2025</a:t>
             </a:fld>
             <a:endParaRPr lang="en-US"/>
           </a:p>
@@ -9648,7 +9648,7 @@
           <a:p>
             <a:fld id="{3540748E-A5A9-4F34-B25A-B9BF70013652}" type="datetimeFigureOut">
               <a:rPr lang="en-US" smtClean="0"/>
-              <a:t>6/21/2024</a:t>
+              <a:t>2/19/2025</a:t>
             </a:fld>
             <a:endParaRPr lang="en-US"/>
           </a:p>
@@ -9889,7 +9889,7 @@
           <a:p>
             <a:fld id="{3540748E-A5A9-4F34-B25A-B9BF70013652}" type="datetimeFigureOut">
               <a:rPr lang="en-US" smtClean="0"/>
-              <a:t>6/21/2024</a:t>
+              <a:t>2/19/2025</a:t>
             </a:fld>
             <a:endParaRPr lang="en-US"/>
           </a:p>
@@ -10322,24 +10322,21 @@
           <a:lstStyle/>
           <a:p>
             <a:r>
-              <a:rPr lang="en-US" b="1" dirty="0">
-                <a:solidFill>
-                  <a:srgbClr val="0070C0"/>
-                </a:solidFill>
-              </a:rPr>
-              <a:t>Bluehouse</a:t>
-            </a:r>
-            <a:r>
               <a:rPr lang="en-US" b="1" dirty="0"/>
-              <a:t> Technologies Data Analyst Track</a:t>
-            </a:r>
-            <a:endParaRPr lang="en-US" dirty="0"/>
+              <a:t>Basics of Statistics for Data Professionals</a:t>
+            </a:r>
           </a:p>
         </p:txBody>
       </p:sp>
       <p:sp>
         <p:nvSpPr>
-          <p:cNvPr id="3" name="Subtitle 2"/>
+          <p:cNvPr id="5" name="Subtitle 4">
+            <a:extLst>
+              <a:ext uri="{FF2B5EF4-FFF2-40B4-BE49-F238E27FC236}">
+                <a16:creationId xmlns:a16="http://schemas.microsoft.com/office/drawing/2014/main" id="{1A7EDB53-1C4F-45D0-C04D-6F8ED398CD1D}"/>
+              </a:ext>
+            </a:extLst>
+          </p:cNvPr>
           <p:cNvSpPr>
             <a:spLocks noGrp="1"/>
           </p:cNvSpPr>
@@ -10349,14 +10346,13 @@
         </p:nvSpPr>
         <p:spPr/>
         <p:txBody>
-          <a:bodyPr>
-            <a:normAutofit/>
-          </a:bodyPr>
+          <a:bodyPr/>
           <a:lstStyle/>
           <a:p>
+            <a:pPr algn="r"/>
             <a:r>
               <a:rPr lang="en-US" dirty="0"/>
-              <a:t>Basics of Statistics for Data Analyst</a:t>
+              <a:t>Samuel Yaula Dutse</a:t>
             </a:r>
           </a:p>
         </p:txBody>

</xml_diff>